<commit_message>
5th docs (2nd presentation)
</commit_message>
<xml_diff>
--- a/Documentation/Space Adventure Game.pptx
+++ b/Documentation/Space Adventure Game.pptx
@@ -3007,6 +3007,10 @@
           <a:bodyPr/>
           <a:lstStyle/>
           <a:p>
+            <a:r>
+              <a:rPr lang="en-GB" smtClean="0"/>
+              <a:t>JOGY</a:t>
+            </a:r>
             <a:endParaRPr lang="en-GB"/>
           </a:p>
         </p:txBody>

</xml_diff>